<commit_message>
*Update 2017 2nd Term Group Meeting & Paper Discussion by JunhaoYuan*
</commit_message>
<xml_diff>
--- a/raw/20180330/20180330_CNLR.pptx
+++ b/raw/20180330/20180330_CNLR.pptx
@@ -5,19 +5,18 @@
     <p:sldMasterId id="2147483648" r:id="rId1"/>
   </p:sldMasterIdLst>
   <p:notesMasterIdLst>
-    <p:notesMasterId r:id="rId12"/>
+    <p:notesMasterId r:id="rId11"/>
   </p:notesMasterIdLst>
   <p:sldIdLst>
     <p:sldId id="256" r:id="rId2"/>
-    <p:sldId id="301" r:id="rId3"/>
-    <p:sldId id="298" r:id="rId4"/>
-    <p:sldId id="300" r:id="rId5"/>
-    <p:sldId id="302" r:id="rId6"/>
-    <p:sldId id="304" r:id="rId7"/>
-    <p:sldId id="303" r:id="rId8"/>
-    <p:sldId id="306" r:id="rId9"/>
-    <p:sldId id="305" r:id="rId10"/>
-    <p:sldId id="297" r:id="rId11"/>
+    <p:sldId id="298" r:id="rId3"/>
+    <p:sldId id="300" r:id="rId4"/>
+    <p:sldId id="302" r:id="rId5"/>
+    <p:sldId id="304" r:id="rId6"/>
+    <p:sldId id="303" r:id="rId7"/>
+    <p:sldId id="306" r:id="rId8"/>
+    <p:sldId id="305" r:id="rId9"/>
+    <p:sldId id="297" r:id="rId10"/>
   </p:sldIdLst>
   <p:sldSz cx="12192000" cy="6858000"/>
   <p:notesSz cx="6858000" cy="9144000"/>
@@ -252,7 +251,7 @@
           <a:p>
             <a:fld id="{8B04ACDA-D526-490B-AA9A-FBFBDFF8059B}" type="datetimeFigureOut">
               <a:rPr lang="zh-CN" altLang="en-US" smtClean="0"/>
-              <a:t>2018/3/29</a:t>
+              <a:t>2018/3/30</a:t>
             </a:fld>
             <a:endParaRPr lang="zh-CN" altLang="en-US"/>
           </a:p>
@@ -585,7 +584,7 @@
           <a:p>
             <a:fld id="{86884B55-E6AB-4E48-A609-C2BF0CF7E934}" type="slidenum">
               <a:rPr lang="zh-CN" altLang="en-US" smtClean="0"/>
-              <a:t>5</a:t>
+              <a:t>4</a:t>
             </a:fld>
             <a:endParaRPr lang="zh-CN" altLang="en-US"/>
           </a:p>
@@ -669,7 +668,7 @@
           <a:p>
             <a:fld id="{86884B55-E6AB-4E48-A609-C2BF0CF7E934}" type="slidenum">
               <a:rPr lang="zh-CN" altLang="en-US" smtClean="0"/>
-              <a:t>6</a:t>
+              <a:t>5</a:t>
             </a:fld>
             <a:endParaRPr lang="zh-CN" altLang="en-US"/>
           </a:p>
@@ -753,7 +752,7 @@
           <a:p>
             <a:fld id="{86884B55-E6AB-4E48-A609-C2BF0CF7E934}" type="slidenum">
               <a:rPr lang="zh-CN" altLang="en-US" smtClean="0"/>
-              <a:t>7</a:t>
+              <a:t>6</a:t>
             </a:fld>
             <a:endParaRPr lang="zh-CN" altLang="en-US"/>
           </a:p>
@@ -837,7 +836,7 @@
           <a:p>
             <a:fld id="{86884B55-E6AB-4E48-A609-C2BF0CF7E934}" type="slidenum">
               <a:rPr lang="zh-CN" altLang="en-US" smtClean="0"/>
-              <a:t>8</a:t>
+              <a:t>7</a:t>
             </a:fld>
             <a:endParaRPr lang="zh-CN" altLang="en-US"/>
           </a:p>
@@ -987,7 +986,7 @@
           <a:p>
             <a:fld id="{92D79A66-49CB-4A06-9C17-CC49CB8E9FC3}" type="datetimeFigureOut">
               <a:rPr lang="en-US" smtClean="0"/>
-              <a:t>3/29/2018</a:t>
+              <a:t>3/30/2018</a:t>
             </a:fld>
             <a:endParaRPr lang="en-US"/>
           </a:p>
@@ -1152,7 +1151,7 @@
           <a:p>
             <a:fld id="{92D79A66-49CB-4A06-9C17-CC49CB8E9FC3}" type="datetimeFigureOut">
               <a:rPr lang="en-US" smtClean="0"/>
-              <a:t>3/29/2018</a:t>
+              <a:t>3/30/2018</a:t>
             </a:fld>
             <a:endParaRPr lang="en-US"/>
           </a:p>
@@ -1327,7 +1326,7 @@
           <a:p>
             <a:fld id="{92D79A66-49CB-4A06-9C17-CC49CB8E9FC3}" type="datetimeFigureOut">
               <a:rPr lang="en-US" smtClean="0"/>
-              <a:t>3/29/2018</a:t>
+              <a:t>3/30/2018</a:t>
             </a:fld>
             <a:endParaRPr lang="en-US"/>
           </a:p>
@@ -1492,7 +1491,7 @@
           <a:p>
             <a:fld id="{92D79A66-49CB-4A06-9C17-CC49CB8E9FC3}" type="datetimeFigureOut">
               <a:rPr lang="en-US" smtClean="0"/>
-              <a:t>3/29/2018</a:t>
+              <a:t>3/30/2018</a:t>
             </a:fld>
             <a:endParaRPr lang="en-US"/>
           </a:p>
@@ -1733,7 +1732,7 @@
           <a:p>
             <a:fld id="{92D79A66-49CB-4A06-9C17-CC49CB8E9FC3}" type="datetimeFigureOut">
               <a:rPr lang="en-US" smtClean="0"/>
-              <a:t>3/29/2018</a:t>
+              <a:t>3/30/2018</a:t>
             </a:fld>
             <a:endParaRPr lang="en-US"/>
           </a:p>
@@ -1960,7 +1959,7 @@
           <a:p>
             <a:fld id="{92D79A66-49CB-4A06-9C17-CC49CB8E9FC3}" type="datetimeFigureOut">
               <a:rPr lang="en-US" smtClean="0"/>
-              <a:t>3/29/2018</a:t>
+              <a:t>3/30/2018</a:t>
             </a:fld>
             <a:endParaRPr lang="en-US"/>
           </a:p>
@@ -2322,7 +2321,7 @@
           <a:p>
             <a:fld id="{92D79A66-49CB-4A06-9C17-CC49CB8E9FC3}" type="datetimeFigureOut">
               <a:rPr lang="en-US" smtClean="0"/>
-              <a:t>3/29/2018</a:t>
+              <a:t>3/30/2018</a:t>
             </a:fld>
             <a:endParaRPr lang="en-US"/>
           </a:p>
@@ -2435,7 +2434,7 @@
           <a:p>
             <a:fld id="{92D79A66-49CB-4A06-9C17-CC49CB8E9FC3}" type="datetimeFigureOut">
               <a:rPr lang="en-US" smtClean="0"/>
-              <a:t>3/29/2018</a:t>
+              <a:t>3/30/2018</a:t>
             </a:fld>
             <a:endParaRPr lang="en-US"/>
           </a:p>
@@ -2525,7 +2524,7 @@
           <a:p>
             <a:fld id="{92D79A66-49CB-4A06-9C17-CC49CB8E9FC3}" type="datetimeFigureOut">
               <a:rPr lang="en-US" smtClean="0"/>
-              <a:t>3/29/2018</a:t>
+              <a:t>3/30/2018</a:t>
             </a:fld>
             <a:endParaRPr lang="en-US"/>
           </a:p>
@@ -2797,7 +2796,7 @@
           <a:p>
             <a:fld id="{92D79A66-49CB-4A06-9C17-CC49CB8E9FC3}" type="datetimeFigureOut">
               <a:rPr lang="en-US" smtClean="0"/>
-              <a:t>3/29/2018</a:t>
+              <a:t>3/30/2018</a:t>
             </a:fld>
             <a:endParaRPr lang="en-US"/>
           </a:p>
@@ -3045,7 +3044,7 @@
           <a:p>
             <a:fld id="{92D79A66-49CB-4A06-9C17-CC49CB8E9FC3}" type="datetimeFigureOut">
               <a:rPr lang="en-US" smtClean="0"/>
-              <a:t>3/29/2018</a:t>
+              <a:t>3/30/2018</a:t>
             </a:fld>
             <a:endParaRPr lang="en-US"/>
           </a:p>
@@ -3263,7 +3262,7 @@
           <a:p>
             <a:fld id="{92D79A66-49CB-4A06-9C17-CC49CB8E9FC3}" type="datetimeFigureOut">
               <a:rPr lang="en-US" smtClean="0"/>
-              <a:t>3/29/2018</a:t>
+              <a:t>3/30/2018</a:t>
             </a:fld>
             <a:endParaRPr lang="en-US"/>
           </a:p>
@@ -3842,16 +3841,6 @@
                 </a:rPr>
                 <a:t>Joint Matrix Factorization</a:t>
               </a:r>
-              <a:endParaRPr lang="en-US" altLang="zh-CN" sz="4400" dirty="0" smtClean="0">
-                <a:solidFill>
-                  <a:schemeClr val="tx1">
-                    <a:lumMod val="75000"/>
-                    <a:lumOff val="25000"/>
-                  </a:schemeClr>
-                </a:solidFill>
-                <a:latin typeface="Times New Roman" panose="02020603050405020304" pitchFamily="18" charset="0"/>
-                <a:cs typeface="Times New Roman" panose="02020603050405020304" pitchFamily="18" charset="0"/>
-              </a:endParaRPr>
             </a:p>
             <a:p>
               <a:endParaRPr lang="en-US" sz="3200" dirty="0">
@@ -3901,21 +3890,7 @@
                   <a:ea typeface="Open Sans" panose="020B0606030504020204" pitchFamily="34" charset="0"/>
                   <a:cs typeface="Open Sans" panose="020B0606030504020204" pitchFamily="34" charset="0"/>
                 </a:rPr>
-                <a:t>From </a:t>
-              </a:r>
-              <a:r>
-                <a:rPr lang="en-US" sz="2400" i="1" dirty="0" smtClean="0">
-                  <a:solidFill>
-                    <a:schemeClr val="tx1">
-                      <a:lumMod val="75000"/>
-                      <a:lumOff val="25000"/>
-                    </a:schemeClr>
-                  </a:solidFill>
-                  <a:latin typeface="Georgia" panose="02040502050405020303" pitchFamily="18" charset="0"/>
-                  <a:ea typeface="Open Sans" panose="020B0606030504020204" pitchFamily="34" charset="0"/>
-                  <a:cs typeface="Open Sans" panose="020B0606030504020204" pitchFamily="34" charset="0"/>
-                </a:rPr>
-                <a:t>AAAI-17</a:t>
+                <a:t>From AAAI-17</a:t>
               </a:r>
               <a:endParaRPr lang="en-US" sz="2400" i="1" dirty="0">
                 <a:solidFill>
@@ -4042,88 +4017,6 @@
 </p:sld>
 </file>
 
-<file path=ppt/slides/slide10.xml><?xml version="1.0" encoding="utf-8"?>
-<p:sld xmlns:a="http://schemas.openxmlformats.org/drawingml/2006/main" xmlns:r="http://schemas.openxmlformats.org/officeDocument/2006/relationships" xmlns:p="http://schemas.openxmlformats.org/presentationml/2006/main">
-  <p:cSld>
-    <p:spTree>
-      <p:nvGrpSpPr>
-        <p:cNvPr id="1" name=""/>
-        <p:cNvGrpSpPr/>
-        <p:nvPr/>
-      </p:nvGrpSpPr>
-      <p:grpSpPr>
-        <a:xfrm>
-          <a:off x="0" y="0"/>
-          <a:ext cx="0" cy="0"/>
-          <a:chOff x="0" y="0"/>
-          <a:chExt cx="0" cy="0"/>
-        </a:xfrm>
-      </p:grpSpPr>
-      <p:sp>
-        <p:nvSpPr>
-          <p:cNvPr id="9" name="TextBox 8"/>
-          <p:cNvSpPr txBox="1"/>
-          <p:nvPr/>
-        </p:nvSpPr>
-        <p:spPr>
-          <a:xfrm>
-            <a:off x="3754335" y="2690336"/>
-            <a:ext cx="4683333" cy="1200329"/>
-          </a:xfrm>
-          <a:prstGeom prst="rect">
-            <a:avLst/>
-          </a:prstGeom>
-          <a:noFill/>
-        </p:spPr>
-        <p:txBody>
-          <a:bodyPr wrap="none" rtlCol="0">
-            <a:spAutoFit/>
-          </a:bodyPr>
-          <a:lstStyle/>
-          <a:p>
-            <a:pPr algn="ctr"/>
-            <a:r>
-              <a:rPr lang="en-US" sz="7200" smtClean="0">
-                <a:solidFill>
-                  <a:schemeClr val="tx1">
-                    <a:lumMod val="75000"/>
-                    <a:lumOff val="25000"/>
-                  </a:schemeClr>
-                </a:solidFill>
-                <a:latin typeface="GeosansLight" panose="02000603020000020003" pitchFamily="2" charset="0"/>
-              </a:rPr>
-              <a:t>THANK YOU</a:t>
-            </a:r>
-            <a:endParaRPr lang="en-US" sz="7200">
-              <a:solidFill>
-                <a:schemeClr val="tx1">
-                  <a:lumMod val="75000"/>
-                  <a:lumOff val="25000"/>
-                </a:schemeClr>
-              </a:solidFill>
-              <a:latin typeface="GeosansLight" panose="02000603020000020003" pitchFamily="2" charset="0"/>
-            </a:endParaRPr>
-          </a:p>
-        </p:txBody>
-      </p:sp>
-    </p:spTree>
-  </p:cSld>
-  <p:clrMapOvr>
-    <a:masterClrMapping/>
-  </p:clrMapOvr>
-  <p:transition spd="slow">
-    <p:push dir="u"/>
-  </p:transition>
-  <p:timing>
-    <p:tnLst>
-      <p:par>
-        <p:cTn id="1" dur="indefinite" restart="never" nodeType="tmRoot"/>
-      </p:par>
-    </p:tnLst>
-  </p:timing>
-</p:sld>
-</file>
-
 <file path=ppt/slides/slide2.xml><?xml version="1.0" encoding="utf-8"?>
 <p:sld xmlns:a="http://schemas.openxmlformats.org/drawingml/2006/main" xmlns:r="http://schemas.openxmlformats.org/officeDocument/2006/relationships" xmlns:p="http://schemas.openxmlformats.org/presentationml/2006/main">
   <p:cSld>
@@ -4153,18 +4046,188 @@
         </p:nvSpPr>
         <p:spPr>
           <a:xfrm>
+            <a:off x="554865" y="481304"/>
+            <a:ext cx="10515600" cy="684357"/>
+          </a:xfrm>
+        </p:spPr>
+        <p:txBody>
+          <a:bodyPr>
+            <a:noAutofit/>
+          </a:bodyPr>
+          <a:lstStyle/>
+          <a:p>
+            <a:r>
+              <a:rPr lang="en-US" altLang="zh-CN" sz="4000" dirty="0" smtClean="0">
+                <a:latin typeface="Times New Roman" panose="02020603050405020304" pitchFamily="18" charset="0"/>
+                <a:cs typeface="Times New Roman" panose="02020603050405020304" pitchFamily="18" charset="0"/>
+              </a:rPr>
+              <a:t>Introduction</a:t>
+            </a:r>
+            <a:endParaRPr lang="zh-CN" altLang="en-US" sz="4000" dirty="0">
+              <a:latin typeface="Times New Roman" panose="02020603050405020304" pitchFamily="18" charset="0"/>
+              <a:cs typeface="Times New Roman" panose="02020603050405020304" pitchFamily="18" charset="0"/>
+            </a:endParaRPr>
+          </a:p>
+        </p:txBody>
+      </p:sp>
+      <p:sp>
+        <p:nvSpPr>
+          <p:cNvPr id="3" name="内容占位符 2"/>
+          <p:cNvSpPr>
+            <a:spLocks noGrp="1"/>
+          </p:cNvSpPr>
+          <p:nvPr>
+            <p:ph idx="1"/>
+          </p:nvPr>
+        </p:nvSpPr>
+        <p:spPr>
+          <a:xfrm>
+            <a:off x="399245" y="1684835"/>
+            <a:ext cx="11668259" cy="4351338"/>
+          </a:xfrm>
+        </p:spPr>
+        <p:txBody>
+          <a:bodyPr>
+            <a:normAutofit fontScale="92500"/>
+          </a:bodyPr>
+          <a:lstStyle/>
+          <a:p>
+            <a:r>
+              <a:rPr lang="en-US" altLang="zh-CN" sz="3600" dirty="0" smtClean="0">
+                <a:latin typeface="Times New Roman" panose="02020603050405020304" pitchFamily="18" charset="0"/>
+                <a:cs typeface="Times New Roman" panose="02020603050405020304" pitchFamily="18" charset="0"/>
+              </a:rPr>
+              <a:t>Cross network </a:t>
+            </a:r>
+            <a:r>
+              <a:rPr lang="en-US" altLang="zh-CN" sz="3600" dirty="0">
+                <a:latin typeface="Times New Roman" panose="02020603050405020304" pitchFamily="18" charset="0"/>
+                <a:cs typeface="Times New Roman" panose="02020603050405020304" pitchFamily="18" charset="0"/>
+              </a:rPr>
+              <a:t>l</a:t>
+            </a:r>
+            <a:r>
+              <a:rPr lang="en-US" altLang="zh-CN" sz="3600" dirty="0" smtClean="0">
+                <a:latin typeface="Times New Roman" panose="02020603050405020304" pitchFamily="18" charset="0"/>
+                <a:cs typeface="Times New Roman" panose="02020603050405020304" pitchFamily="18" charset="0"/>
+              </a:rPr>
+              <a:t>ink recommendation</a:t>
+            </a:r>
+          </a:p>
+          <a:p>
+            <a:endParaRPr lang="en-US" altLang="zh-CN" sz="3600" dirty="0" smtClean="0">
+              <a:latin typeface="Times New Roman" panose="02020603050405020304" pitchFamily="18" charset="0"/>
+              <a:cs typeface="Times New Roman" panose="02020603050405020304" pitchFamily="18" charset="0"/>
+            </a:endParaRPr>
+          </a:p>
+          <a:p>
+            <a:r>
+              <a:rPr lang="en-US" altLang="zh-CN" sz="3600" dirty="0" smtClean="0">
+                <a:latin typeface="Times New Roman" panose="02020603050405020304" pitchFamily="18" charset="0"/>
+                <a:cs typeface="Times New Roman" panose="02020603050405020304" pitchFamily="18" charset="0"/>
+              </a:rPr>
+              <a:t>Identify similar </a:t>
+            </a:r>
+            <a:r>
+              <a:rPr lang="en-US" altLang="zh-CN" sz="3600" dirty="0">
+                <a:latin typeface="Times New Roman" panose="02020603050405020304" pitchFamily="18" charset="0"/>
+                <a:cs typeface="Times New Roman" panose="02020603050405020304" pitchFamily="18" charset="0"/>
+              </a:rPr>
+              <a:t>p</a:t>
+            </a:r>
+            <a:r>
+              <a:rPr lang="en-US" altLang="zh-CN" sz="3600" dirty="0" smtClean="0">
+                <a:latin typeface="Times New Roman" panose="02020603050405020304" pitchFamily="18" charset="0"/>
+                <a:cs typeface="Times New Roman" panose="02020603050405020304" pitchFamily="18" charset="0"/>
+              </a:rPr>
+              <a:t>atients from heterogeneous SNs (Aim)</a:t>
+            </a:r>
+          </a:p>
+          <a:p>
+            <a:endParaRPr lang="en-US" altLang="zh-CN" sz="3600" dirty="0" smtClean="0">
+              <a:latin typeface="Times New Roman" panose="02020603050405020304" pitchFamily="18" charset="0"/>
+              <a:cs typeface="Times New Roman" panose="02020603050405020304" pitchFamily="18" charset="0"/>
+            </a:endParaRPr>
+          </a:p>
+          <a:p>
+            <a:r>
+              <a:rPr lang="en-US" altLang="zh-CN" sz="3600" dirty="0" smtClean="0">
+                <a:latin typeface="Times New Roman" panose="02020603050405020304" pitchFamily="18" charset="0"/>
+                <a:cs typeface="Times New Roman" panose="02020603050405020304" pitchFamily="18" charset="0"/>
+              </a:rPr>
+              <a:t>Jointly decompose the user-keyword matrices</a:t>
+            </a:r>
+          </a:p>
+          <a:p>
+            <a:endParaRPr lang="en-US" altLang="zh-CN" sz="3600" dirty="0">
+              <a:latin typeface="Times New Roman" panose="02020603050405020304" pitchFamily="18" charset="0"/>
+              <a:cs typeface="Times New Roman" panose="02020603050405020304" pitchFamily="18" charset="0"/>
+            </a:endParaRPr>
+          </a:p>
+          <a:p>
+            <a:r>
+              <a:rPr lang="en-US" altLang="zh-CN" sz="3600" dirty="0" smtClean="0">
+                <a:latin typeface="Times New Roman" panose="02020603050405020304" pitchFamily="18" charset="0"/>
+                <a:cs typeface="Times New Roman" panose="02020603050405020304" pitchFamily="18" charset="0"/>
+              </a:rPr>
+              <a:t>Previous Work: different accounts same user / find complementary</a:t>
+            </a:r>
+            <a:endParaRPr lang="en-US" altLang="zh-CN" sz="3600" dirty="0">
+              <a:latin typeface="Times New Roman" panose="02020603050405020304" pitchFamily="18" charset="0"/>
+              <a:cs typeface="Times New Roman" panose="02020603050405020304" pitchFamily="18" charset="0"/>
+            </a:endParaRPr>
+          </a:p>
+          <a:p>
+            <a:endParaRPr lang="en-US" altLang="zh-CN" dirty="0" smtClean="0"/>
+          </a:p>
+          <a:p>
+            <a:endParaRPr lang="en-US" altLang="zh-CN" dirty="0" smtClean="0"/>
+          </a:p>
+        </p:txBody>
+      </p:sp>
+      <p:sp>
+        <p:nvSpPr>
+          <p:cNvPr id="4" name="标题 1"/>
+          <p:cNvSpPr txBox="1">
+            <a:spLocks/>
+          </p:cNvSpPr>
+          <p:nvPr/>
+        </p:nvSpPr>
+        <p:spPr>
+          <a:xfrm>
             <a:off x="2924578" y="6006073"/>
             <a:ext cx="6592909" cy="549274"/>
           </a:xfrm>
-        </p:spPr>
-        <p:txBody>
-          <a:bodyPr>
+          <a:prstGeom prst="rect">
+            <a:avLst/>
+          </a:prstGeom>
+        </p:spPr>
+        <p:txBody>
+          <a:bodyPr vert="horz" lIns="91440" tIns="45720" rIns="91440" bIns="45720" rtlCol="0" anchor="ctr">
             <a:normAutofit/>
           </a:bodyPr>
-          <a:lstStyle/>
-          <a:p>
-            <a:r>
-              <a:rPr lang="en-US" altLang="zh-CN" sz="1800" dirty="0">
+          <a:lstStyle>
+            <a:lvl1pPr algn="l" defTabSz="914400" rtl="0" eaLnBrk="1" latinLnBrk="0" hangingPunct="1">
+              <a:lnSpc>
+                <a:spcPct val="90000"/>
+              </a:lnSpc>
+              <a:spcBef>
+                <a:spcPct val="0"/>
+              </a:spcBef>
+              <a:buNone/>
+              <a:defRPr sz="4400" kern="1200">
+                <a:solidFill>
+                  <a:schemeClr val="tx1"/>
+                </a:solidFill>
+                <a:latin typeface="+mj-lt"/>
+                <a:ea typeface="+mj-ea"/>
+                <a:cs typeface="+mj-cs"/>
+              </a:defRPr>
+            </a:lvl1pPr>
+          </a:lstStyle>
+          <a:p>
+            <a:r>
+              <a:rPr lang="en-US" altLang="zh-CN" sz="1800" smtClean="0">
                 <a:solidFill>
                   <a:schemeClr val="tx1">
                     <a:lumMod val="75000"/>
@@ -4174,144 +4237,25 @@
                 <a:latin typeface="Times New Roman" panose="02020603050405020304" pitchFamily="18" charset="0"/>
                 <a:cs typeface="Times New Roman" panose="02020603050405020304" pitchFamily="18" charset="0"/>
               </a:rPr>
-              <a:t>Cross Network Link Recommendation via </a:t>
-            </a:r>
-            <a:r>
-              <a:rPr lang="en-US" altLang="zh-CN" sz="1800" dirty="0" smtClean="0">
-                <a:solidFill>
-                  <a:schemeClr val="tx1">
-                    <a:lumMod val="75000"/>
-                    <a:lumOff val="25000"/>
-                  </a:schemeClr>
-                </a:solidFill>
-                <a:latin typeface="Times New Roman" panose="02020603050405020304" pitchFamily="18" charset="0"/>
-                <a:cs typeface="Times New Roman" panose="02020603050405020304" pitchFamily="18" charset="0"/>
-              </a:rPr>
-              <a:t>Joint </a:t>
-            </a:r>
-            <a:r>
-              <a:rPr lang="en-US" altLang="zh-CN" sz="1800" dirty="0">
-                <a:solidFill>
-                  <a:schemeClr val="tx1">
-                    <a:lumMod val="75000"/>
-                    <a:lumOff val="25000"/>
-                  </a:schemeClr>
-                </a:solidFill>
-                <a:latin typeface="Times New Roman" panose="02020603050405020304" pitchFamily="18" charset="0"/>
-                <a:cs typeface="Times New Roman" panose="02020603050405020304" pitchFamily="18" charset="0"/>
-              </a:rPr>
-              <a:t>Matrix Factorization</a:t>
-            </a:r>
-          </a:p>
-        </p:txBody>
-      </p:sp>
-      <p:sp>
-        <p:nvSpPr>
-          <p:cNvPr id="3" name="内容占位符 2"/>
-          <p:cNvSpPr>
-            <a:spLocks noGrp="1"/>
-          </p:cNvSpPr>
-          <p:nvPr>
-            <p:ph idx="1"/>
-          </p:nvPr>
-        </p:nvSpPr>
-        <p:spPr>
-          <a:xfrm>
-            <a:off x="645017" y="1168802"/>
-            <a:ext cx="10515600" cy="4351338"/>
-          </a:xfrm>
-        </p:spPr>
-        <p:txBody>
-          <a:bodyPr/>
-          <a:lstStyle/>
-          <a:p>
-            <a:pPr marL="0" indent="0">
-              <a:buNone/>
-            </a:pPr>
-            <a:r>
-              <a:rPr lang="en-US" altLang="zh-CN" sz="3200" dirty="0" smtClean="0">
-                <a:latin typeface="Times New Roman" panose="02020603050405020304" pitchFamily="18" charset="0"/>
-                <a:cs typeface="Times New Roman" panose="02020603050405020304" pitchFamily="18" charset="0"/>
-              </a:rPr>
-              <a:t>Authors:</a:t>
-            </a:r>
-          </a:p>
-          <a:p>
-            <a:pPr marL="0" indent="0">
-              <a:buNone/>
-            </a:pPr>
-            <a:endParaRPr lang="en-US" altLang="zh-CN" sz="3200" dirty="0" smtClean="0">
+              <a:t>Cross Network Link Recommendation via Joint Matrix Factorization</a:t>
+            </a:r>
+            <a:endParaRPr lang="en-US" altLang="zh-CN" sz="1800" dirty="0">
+              <a:solidFill>
+                <a:schemeClr val="tx1">
+                  <a:lumMod val="75000"/>
+                  <a:lumOff val="25000"/>
+                </a:schemeClr>
+              </a:solidFill>
               <a:latin typeface="Times New Roman" panose="02020603050405020304" pitchFamily="18" charset="0"/>
               <a:cs typeface="Times New Roman" panose="02020603050405020304" pitchFamily="18" charset="0"/>
             </a:endParaRPr>
           </a:p>
-          <a:p>
-            <a:pPr marL="0" indent="0">
-              <a:buNone/>
-            </a:pPr>
-            <a:r>
-              <a:rPr lang="en-US" altLang="zh-CN" i="1" dirty="0" smtClean="0">
-                <a:latin typeface="Times New Roman" panose="02020603050405020304" pitchFamily="18" charset="0"/>
-                <a:cs typeface="Times New Roman" panose="02020603050405020304" pitchFamily="18" charset="0"/>
-              </a:rPr>
-              <a:t>Arizona State University</a:t>
-            </a:r>
-          </a:p>
-          <a:p>
-            <a:r>
-              <a:rPr lang="en-US" altLang="zh-CN" dirty="0" err="1" smtClean="0">
-                <a:latin typeface="Times New Roman" panose="02020603050405020304" pitchFamily="18" charset="0"/>
-                <a:cs typeface="Times New Roman" panose="02020603050405020304" pitchFamily="18" charset="0"/>
-              </a:rPr>
-              <a:t>Arun</a:t>
-            </a:r>
-            <a:r>
-              <a:rPr lang="en-US" altLang="zh-CN" dirty="0" smtClean="0">
-                <a:latin typeface="Times New Roman" panose="02020603050405020304" pitchFamily="18" charset="0"/>
-                <a:cs typeface="Times New Roman" panose="02020603050405020304" pitchFamily="18" charset="0"/>
-              </a:rPr>
-              <a:t> Reddy </a:t>
-            </a:r>
-            <a:r>
-              <a:rPr lang="en-US" altLang="zh-CN" dirty="0" err="1" smtClean="0">
-                <a:latin typeface="Times New Roman" panose="02020603050405020304" pitchFamily="18" charset="0"/>
-                <a:cs typeface="Times New Roman" panose="02020603050405020304" pitchFamily="18" charset="0"/>
-              </a:rPr>
-              <a:t>Nelakurthi</a:t>
-            </a:r>
-            <a:endParaRPr lang="en-US" altLang="zh-CN" dirty="0" smtClean="0">
-              <a:latin typeface="Times New Roman" panose="02020603050405020304" pitchFamily="18" charset="0"/>
-              <a:cs typeface="Times New Roman" panose="02020603050405020304" pitchFamily="18" charset="0"/>
-            </a:endParaRPr>
-          </a:p>
-          <a:p>
-            <a:r>
-              <a:rPr lang="en-US" altLang="zh-CN" dirty="0" err="1" smtClean="0">
-                <a:latin typeface="Times New Roman" panose="02020603050405020304" pitchFamily="18" charset="0"/>
-                <a:cs typeface="Times New Roman" panose="02020603050405020304" pitchFamily="18" charset="0"/>
-              </a:rPr>
-              <a:t>Jingrui</a:t>
-            </a:r>
-            <a:r>
-              <a:rPr lang="en-US" altLang="zh-CN" dirty="0" smtClean="0">
-                <a:latin typeface="Times New Roman" panose="02020603050405020304" pitchFamily="18" charset="0"/>
-                <a:cs typeface="Times New Roman" panose="02020603050405020304" pitchFamily="18" charset="0"/>
-              </a:rPr>
-              <a:t> He</a:t>
-            </a:r>
-          </a:p>
-          <a:p>
-            <a:endParaRPr lang="zh-CN" altLang="en-US" dirty="0">
-              <a:latin typeface="Times New Roman" panose="02020603050405020304" pitchFamily="18" charset="0"/>
-              <a:cs typeface="Times New Roman" panose="02020603050405020304" pitchFamily="18" charset="0"/>
-            </a:endParaRPr>
-          </a:p>
         </p:txBody>
       </p:sp>
     </p:spTree>
     <p:extLst>
       <p:ext uri="{BB962C8B-B14F-4D97-AF65-F5344CB8AC3E}">
-        <p14:creationId xmlns:p14="http://schemas.microsoft.com/office/powerpoint/2010/main" val="1611967641"/>
+        <p14:creationId xmlns:p14="http://schemas.microsoft.com/office/powerpoint/2010/main" val="4633129"/>
       </p:ext>
     </p:extLst>
   </p:cSld>
@@ -4350,7 +4294,7 @@
         </p:nvSpPr>
         <p:spPr>
           <a:xfrm>
-            <a:off x="554865" y="481304"/>
+            <a:off x="838200" y="417080"/>
             <a:ext cx="10515600" cy="684357"/>
           </a:xfrm>
         </p:spPr>
@@ -4365,7 +4309,7 @@
                 <a:latin typeface="Times New Roman" panose="02020603050405020304" pitchFamily="18" charset="0"/>
                 <a:cs typeface="Times New Roman" panose="02020603050405020304" pitchFamily="18" charset="0"/>
               </a:rPr>
-              <a:t>Introduction</a:t>
+              <a:t>Cross Network Link Recommendation</a:t>
             </a:r>
             <a:endParaRPr lang="zh-CN" altLang="en-US" sz="4000" dirty="0">
               <a:latin typeface="Times New Roman" panose="02020603050405020304" pitchFamily="18" charset="0"/>
@@ -4386,194 +4330,70 @@
         </p:nvSpPr>
         <p:spPr>
           <a:xfrm>
-            <a:off x="399245" y="1684835"/>
-            <a:ext cx="11668259" cy="4351338"/>
-          </a:xfrm>
-        </p:spPr>
-        <p:txBody>
-          <a:bodyPr>
-            <a:normAutofit fontScale="92500"/>
-          </a:bodyPr>
-          <a:lstStyle/>
-          <a:p>
-            <a:r>
-              <a:rPr lang="en-US" altLang="zh-CN" sz="3600" dirty="0" smtClean="0">
-                <a:latin typeface="Times New Roman" panose="02020603050405020304" pitchFamily="18" charset="0"/>
-                <a:cs typeface="Times New Roman" panose="02020603050405020304" pitchFamily="18" charset="0"/>
-              </a:rPr>
-              <a:t>Cross network </a:t>
-            </a:r>
-            <a:r>
-              <a:rPr lang="en-US" altLang="zh-CN" sz="3600" dirty="0">
-                <a:latin typeface="Times New Roman" panose="02020603050405020304" pitchFamily="18" charset="0"/>
-                <a:cs typeface="Times New Roman" panose="02020603050405020304" pitchFamily="18" charset="0"/>
-              </a:rPr>
-              <a:t>l</a:t>
-            </a:r>
-            <a:r>
-              <a:rPr lang="en-US" altLang="zh-CN" sz="3600" dirty="0" smtClean="0">
-                <a:latin typeface="Times New Roman" panose="02020603050405020304" pitchFamily="18" charset="0"/>
-                <a:cs typeface="Times New Roman" panose="02020603050405020304" pitchFamily="18" charset="0"/>
-              </a:rPr>
-              <a:t>ink </a:t>
-            </a:r>
-            <a:r>
-              <a:rPr lang="en-US" altLang="zh-CN" sz="3600" dirty="0" smtClean="0">
-                <a:latin typeface="Times New Roman" panose="02020603050405020304" pitchFamily="18" charset="0"/>
-                <a:cs typeface="Times New Roman" panose="02020603050405020304" pitchFamily="18" charset="0"/>
-              </a:rPr>
-              <a:t>r</a:t>
-            </a:r>
-            <a:r>
-              <a:rPr lang="en-US" altLang="zh-CN" sz="3600" dirty="0" smtClean="0">
-                <a:latin typeface="Times New Roman" panose="02020603050405020304" pitchFamily="18" charset="0"/>
-                <a:cs typeface="Times New Roman" panose="02020603050405020304" pitchFamily="18" charset="0"/>
-              </a:rPr>
-              <a:t>ecommendation</a:t>
-            </a:r>
-          </a:p>
-          <a:p>
-            <a:endParaRPr lang="en-US" altLang="zh-CN" sz="3600" dirty="0" smtClean="0">
-              <a:latin typeface="Times New Roman" panose="02020603050405020304" pitchFamily="18" charset="0"/>
-              <a:cs typeface="Times New Roman" panose="02020603050405020304" pitchFamily="18" charset="0"/>
-            </a:endParaRPr>
-          </a:p>
-          <a:p>
-            <a:r>
-              <a:rPr lang="en-US" altLang="zh-CN" sz="3600" dirty="0" smtClean="0">
-                <a:latin typeface="Times New Roman" panose="02020603050405020304" pitchFamily="18" charset="0"/>
-                <a:cs typeface="Times New Roman" panose="02020603050405020304" pitchFamily="18" charset="0"/>
-              </a:rPr>
-              <a:t>Identify similar </a:t>
-            </a:r>
-            <a:r>
-              <a:rPr lang="en-US" altLang="zh-CN" sz="3600" dirty="0">
-                <a:latin typeface="Times New Roman" panose="02020603050405020304" pitchFamily="18" charset="0"/>
-                <a:cs typeface="Times New Roman" panose="02020603050405020304" pitchFamily="18" charset="0"/>
-              </a:rPr>
-              <a:t>p</a:t>
-            </a:r>
-            <a:r>
-              <a:rPr lang="en-US" altLang="zh-CN" sz="3600" dirty="0" smtClean="0">
-                <a:latin typeface="Times New Roman" panose="02020603050405020304" pitchFamily="18" charset="0"/>
-                <a:cs typeface="Times New Roman" panose="02020603050405020304" pitchFamily="18" charset="0"/>
-              </a:rPr>
-              <a:t>atients from heterogeneous SNs (Aim)</a:t>
-            </a:r>
-          </a:p>
-          <a:p>
-            <a:endParaRPr lang="en-US" altLang="zh-CN" sz="3600" dirty="0" smtClean="0">
-              <a:latin typeface="Times New Roman" panose="02020603050405020304" pitchFamily="18" charset="0"/>
-              <a:cs typeface="Times New Roman" panose="02020603050405020304" pitchFamily="18" charset="0"/>
-            </a:endParaRPr>
-          </a:p>
-          <a:p>
-            <a:r>
-              <a:rPr lang="en-US" altLang="zh-CN" sz="3600" dirty="0" smtClean="0">
-                <a:latin typeface="Times New Roman" panose="02020603050405020304" pitchFamily="18" charset="0"/>
-                <a:cs typeface="Times New Roman" panose="02020603050405020304" pitchFamily="18" charset="0"/>
-              </a:rPr>
-              <a:t>Jointly decompose the user-keyword matrices</a:t>
-            </a:r>
-          </a:p>
-          <a:p>
-            <a:endParaRPr lang="en-US" altLang="zh-CN" sz="3600" dirty="0">
-              <a:latin typeface="Times New Roman" panose="02020603050405020304" pitchFamily="18" charset="0"/>
-              <a:cs typeface="Times New Roman" panose="02020603050405020304" pitchFamily="18" charset="0"/>
-            </a:endParaRPr>
-          </a:p>
-          <a:p>
-            <a:r>
-              <a:rPr lang="en-US" altLang="zh-CN" sz="3600" dirty="0" smtClean="0">
-                <a:latin typeface="Times New Roman" panose="02020603050405020304" pitchFamily="18" charset="0"/>
-                <a:cs typeface="Times New Roman" panose="02020603050405020304" pitchFamily="18" charset="0"/>
-              </a:rPr>
-              <a:t>Previous Work: different accounts same user / find complementary</a:t>
-            </a:r>
-            <a:endParaRPr lang="en-US" altLang="zh-CN" sz="3600" dirty="0">
-              <a:latin typeface="Times New Roman" panose="02020603050405020304" pitchFamily="18" charset="0"/>
-              <a:cs typeface="Times New Roman" panose="02020603050405020304" pitchFamily="18" charset="0"/>
-            </a:endParaRPr>
-          </a:p>
+            <a:off x="683653" y="1774988"/>
+            <a:ext cx="10515600" cy="4351338"/>
+          </a:xfrm>
+        </p:spPr>
+        <p:txBody>
+          <a:bodyPr/>
+          <a:lstStyle/>
           <a:p>
             <a:endParaRPr lang="en-US" altLang="zh-CN" dirty="0" smtClean="0"/>
           </a:p>
-          <a:p>
-            <a:endParaRPr lang="en-US" altLang="zh-CN" dirty="0" smtClean="0"/>
-          </a:p>
-        </p:txBody>
-      </p:sp>
-      <p:sp>
-        <p:nvSpPr>
-          <p:cNvPr id="4" name="标题 1"/>
-          <p:cNvSpPr txBox="1">
-            <a:spLocks/>
-          </p:cNvSpPr>
+        </p:txBody>
+      </p:sp>
+      <p:pic>
+        <p:nvPicPr>
+          <p:cNvPr id="4" name="图片 3"/>
+          <p:cNvPicPr>
+            <a:picLocks noChangeAspect="1"/>
+          </p:cNvPicPr>
           <p:nvPr/>
-        </p:nvSpPr>
-        <p:spPr>
-          <a:xfrm>
-            <a:off x="2924578" y="6006073"/>
-            <a:ext cx="6592909" cy="549274"/>
+        </p:nvPicPr>
+        <p:blipFill>
+          <a:blip r:embed="rId2"/>
+          <a:stretch>
+            <a:fillRect/>
+          </a:stretch>
+        </p:blipFill>
+        <p:spPr>
+          <a:xfrm>
+            <a:off x="2215166" y="998406"/>
+            <a:ext cx="8049296" cy="3469535"/>
           </a:xfrm>
           <a:prstGeom prst="rect">
             <a:avLst/>
           </a:prstGeom>
         </p:spPr>
-        <p:txBody>
-          <a:bodyPr vert="horz" lIns="91440" tIns="45720" rIns="91440" bIns="45720" rtlCol="0" anchor="ctr">
-            <a:normAutofit/>
-          </a:bodyPr>
-          <a:lstStyle>
-            <a:lvl1pPr algn="l" defTabSz="914400" rtl="0" eaLnBrk="1" latinLnBrk="0" hangingPunct="1">
-              <a:lnSpc>
-                <a:spcPct val="90000"/>
-              </a:lnSpc>
-              <a:spcBef>
-                <a:spcPct val="0"/>
-              </a:spcBef>
-              <a:buNone/>
-              <a:defRPr sz="4400" kern="1200">
-                <a:solidFill>
-                  <a:schemeClr val="tx1"/>
-                </a:solidFill>
-                <a:latin typeface="+mj-lt"/>
-                <a:ea typeface="+mj-ea"/>
-                <a:cs typeface="+mj-cs"/>
-              </a:defRPr>
-            </a:lvl1pPr>
-          </a:lstStyle>
-          <a:p>
-            <a:r>
-              <a:rPr lang="en-US" altLang="zh-CN" sz="1800" smtClean="0">
-                <a:solidFill>
-                  <a:schemeClr val="tx1">
-                    <a:lumMod val="75000"/>
-                    <a:lumOff val="25000"/>
-                  </a:schemeClr>
-                </a:solidFill>
-                <a:latin typeface="Times New Roman" panose="02020603050405020304" pitchFamily="18" charset="0"/>
-                <a:cs typeface="Times New Roman" panose="02020603050405020304" pitchFamily="18" charset="0"/>
-              </a:rPr>
-              <a:t>Cross Network Link Recommendation via Joint Matrix Factorization</a:t>
-            </a:r>
-            <a:endParaRPr lang="en-US" altLang="zh-CN" sz="1800" dirty="0">
-              <a:solidFill>
-                <a:schemeClr val="tx1">
-                  <a:lumMod val="75000"/>
-                  <a:lumOff val="25000"/>
-                </a:schemeClr>
-              </a:solidFill>
-              <a:latin typeface="Times New Roman" panose="02020603050405020304" pitchFamily="18" charset="0"/>
-              <a:cs typeface="Times New Roman" panose="02020603050405020304" pitchFamily="18" charset="0"/>
-            </a:endParaRPr>
-          </a:p>
-        </p:txBody>
-      </p:sp>
+      </p:pic>
+      <p:pic>
+        <p:nvPicPr>
+          <p:cNvPr id="5" name="图片 4"/>
+          <p:cNvPicPr>
+            <a:picLocks noChangeAspect="1"/>
+          </p:cNvPicPr>
+          <p:nvPr/>
+        </p:nvPicPr>
+        <p:blipFill>
+          <a:blip r:embed="rId3"/>
+          <a:stretch>
+            <a:fillRect/>
+          </a:stretch>
+        </p:blipFill>
+        <p:spPr>
+          <a:xfrm>
+            <a:off x="3912380" y="4558093"/>
+            <a:ext cx="4654867" cy="2113163"/>
+          </a:xfrm>
+          <a:prstGeom prst="rect">
+            <a:avLst/>
+          </a:prstGeom>
+        </p:spPr>
+      </p:pic>
     </p:spTree>
     <p:extLst>
       <p:ext uri="{BB962C8B-B14F-4D97-AF65-F5344CB8AC3E}">
-        <p14:creationId xmlns:p14="http://schemas.microsoft.com/office/powerpoint/2010/main" val="4633129"/>
+        <p14:creationId xmlns:p14="http://schemas.microsoft.com/office/powerpoint/2010/main" val="3379876225"/>
       </p:ext>
     </p:extLst>
   </p:cSld>
@@ -4612,13 +4432,13 @@
         </p:nvSpPr>
         <p:spPr>
           <a:xfrm>
-            <a:off x="838200" y="417080"/>
-            <a:ext cx="10515600" cy="684357"/>
+            <a:off x="632138" y="0"/>
+            <a:ext cx="10515600" cy="1325563"/>
           </a:xfrm>
         </p:spPr>
         <p:txBody>
           <a:bodyPr>
-            <a:noAutofit/>
+            <a:normAutofit/>
           </a:bodyPr>
           <a:lstStyle/>
           <a:p>
@@ -4627,7 +4447,7 @@
                 <a:latin typeface="Times New Roman" panose="02020603050405020304" pitchFamily="18" charset="0"/>
                 <a:cs typeface="Times New Roman" panose="02020603050405020304" pitchFamily="18" charset="0"/>
               </a:rPr>
-              <a:t>Cross Network Link Recommendation</a:t>
+              <a:t>Related NMTF</a:t>
             </a:r>
             <a:endParaRPr lang="zh-CN" altLang="en-US" sz="4000" dirty="0">
               <a:latin typeface="Times New Roman" panose="02020603050405020304" pitchFamily="18" charset="0"/>
@@ -4648,7 +4468,7 @@
         </p:nvSpPr>
         <p:spPr>
           <a:xfrm>
-            <a:off x="683653" y="1774988"/>
+            <a:off x="632138" y="1124973"/>
             <a:ext cx="10515600" cy="4351338"/>
           </a:xfrm>
         </p:spPr>
@@ -4656,37 +4476,106 @@
           <a:bodyPr/>
           <a:lstStyle/>
           <a:p>
-            <a:endParaRPr lang="en-US" altLang="zh-CN" dirty="0" smtClean="0"/>
+            <a:pPr marL="0" indent="0">
+              <a:buNone/>
+            </a:pPr>
+            <a:r>
+              <a:rPr lang="en-US" altLang="zh-CN" sz="2400" i="1" dirty="0" smtClean="0">
+                <a:latin typeface="Times New Roman" panose="02020603050405020304" pitchFamily="18" charset="0"/>
+                <a:cs typeface="Times New Roman" panose="02020603050405020304" pitchFamily="18" charset="0"/>
+              </a:rPr>
+              <a:t>NMTF</a:t>
+            </a:r>
+          </a:p>
+          <a:p>
+            <a:endParaRPr lang="en-US" altLang="zh-CN" dirty="0">
+              <a:latin typeface="Times New Roman" panose="02020603050405020304" pitchFamily="18" charset="0"/>
+              <a:cs typeface="Times New Roman" panose="02020603050405020304" pitchFamily="18" charset="0"/>
+            </a:endParaRPr>
+          </a:p>
+          <a:p>
+            <a:pPr marL="0" indent="0">
+              <a:buNone/>
+            </a:pPr>
+            <a:endParaRPr lang="en-US" altLang="zh-CN" i="1" dirty="0" smtClean="0">
+              <a:latin typeface="Times New Roman" panose="02020603050405020304" pitchFamily="18" charset="0"/>
+              <a:cs typeface="Times New Roman" panose="02020603050405020304" pitchFamily="18" charset="0"/>
+            </a:endParaRPr>
+          </a:p>
+          <a:p>
+            <a:pPr marL="0" indent="0">
+              <a:buNone/>
+            </a:pPr>
+            <a:r>
+              <a:rPr lang="en-US" altLang="zh-CN" sz="2400" i="1" dirty="0" smtClean="0">
+                <a:latin typeface="Times New Roman" panose="02020603050405020304" pitchFamily="18" charset="0"/>
+                <a:cs typeface="Times New Roman" panose="02020603050405020304" pitchFamily="18" charset="0"/>
+              </a:rPr>
+              <a:t>Graph based NMF</a:t>
+            </a:r>
+          </a:p>
+          <a:p>
+            <a:pPr marL="0" indent="0">
+              <a:buNone/>
+            </a:pPr>
+            <a:endParaRPr lang="en-US" altLang="zh-CN" dirty="0">
+              <a:latin typeface="Times New Roman" panose="02020603050405020304" pitchFamily="18" charset="0"/>
+              <a:cs typeface="Times New Roman" panose="02020603050405020304" pitchFamily="18" charset="0"/>
+            </a:endParaRPr>
+          </a:p>
+          <a:p>
+            <a:pPr marL="0" indent="0">
+              <a:buNone/>
+            </a:pPr>
+            <a:endParaRPr lang="en-US" altLang="zh-CN" dirty="0" smtClean="0">
+              <a:latin typeface="Times New Roman" panose="02020603050405020304" pitchFamily="18" charset="0"/>
+              <a:cs typeface="Times New Roman" panose="02020603050405020304" pitchFamily="18" charset="0"/>
+            </a:endParaRPr>
+          </a:p>
+          <a:p>
+            <a:pPr marL="0" indent="0">
+              <a:buNone/>
+            </a:pPr>
+            <a:endParaRPr lang="en-US" altLang="zh-CN" sz="2400" i="1" dirty="0" smtClean="0">
+              <a:latin typeface="Times New Roman" panose="02020603050405020304" pitchFamily="18" charset="0"/>
+              <a:cs typeface="Times New Roman" panose="02020603050405020304" pitchFamily="18" charset="0"/>
+            </a:endParaRPr>
+          </a:p>
+          <a:p>
+            <a:pPr marL="0" indent="0">
+              <a:buNone/>
+            </a:pPr>
+            <a:r>
+              <a:rPr lang="en-US" altLang="zh-CN" sz="2400" i="1" dirty="0" smtClean="0">
+                <a:latin typeface="Times New Roman" panose="02020603050405020304" pitchFamily="18" charset="0"/>
+                <a:cs typeface="Times New Roman" panose="02020603050405020304" pitchFamily="18" charset="0"/>
+              </a:rPr>
+              <a:t>IGNMTF       </a:t>
+            </a:r>
+            <a:r>
+              <a:rPr lang="en-US" altLang="zh-CN" sz="2400" i="1" dirty="0" err="1" smtClean="0">
+                <a:latin typeface="Times New Roman" panose="02020603050405020304" pitchFamily="18" charset="0"/>
+                <a:cs typeface="Times New Roman" panose="02020603050405020304" pitchFamily="18" charset="0"/>
+              </a:rPr>
+              <a:t>Gu</a:t>
+            </a:r>
+            <a:r>
+              <a:rPr lang="en-US" altLang="zh-CN" sz="2400" i="1" dirty="0" smtClean="0">
+                <a:latin typeface="Times New Roman" panose="02020603050405020304" pitchFamily="18" charset="0"/>
+                <a:cs typeface="Times New Roman" panose="02020603050405020304" pitchFamily="18" charset="0"/>
+              </a:rPr>
+              <a:t>, Ding, Han(2011) + Huang et al.(2014)</a:t>
+            </a:r>
+            <a:endParaRPr lang="zh-CN" altLang="en-US" sz="2400" i="1" dirty="0">
+              <a:latin typeface="Times New Roman" panose="02020603050405020304" pitchFamily="18" charset="0"/>
+              <a:cs typeface="Times New Roman" panose="02020603050405020304" pitchFamily="18" charset="0"/>
+            </a:endParaRPr>
           </a:p>
         </p:txBody>
       </p:sp>
       <p:pic>
         <p:nvPicPr>
-          <p:cNvPr id="4" name="图片 3"/>
-          <p:cNvPicPr>
-            <a:picLocks noChangeAspect="1"/>
-          </p:cNvPicPr>
-          <p:nvPr/>
-        </p:nvPicPr>
-        <p:blipFill>
-          <a:blip r:embed="rId2"/>
-          <a:stretch>
-            <a:fillRect/>
-          </a:stretch>
-        </p:blipFill>
-        <p:spPr>
-          <a:xfrm>
-            <a:off x="2215166" y="998406"/>
-            <a:ext cx="8049296" cy="3469535"/>
-          </a:xfrm>
-          <a:prstGeom prst="rect">
-            <a:avLst/>
-          </a:prstGeom>
-        </p:spPr>
-      </p:pic>
-      <p:pic>
-        <p:nvPicPr>
-          <p:cNvPr id="5" name="图片 4"/>
+          <p:cNvPr id="6" name="图片 5"/>
           <p:cNvPicPr>
             <a:picLocks noChangeAspect="1"/>
           </p:cNvPicPr>
@@ -4700,8 +4589,128 @@
         </p:blipFill>
         <p:spPr>
           <a:xfrm>
-            <a:off x="3912380" y="4558093"/>
-            <a:ext cx="4654867" cy="2113163"/>
+            <a:off x="1029215" y="1558357"/>
+            <a:ext cx="5279149" cy="659999"/>
+          </a:xfrm>
+          <a:prstGeom prst="rect">
+            <a:avLst/>
+          </a:prstGeom>
+        </p:spPr>
+      </p:pic>
+      <p:pic>
+        <p:nvPicPr>
+          <p:cNvPr id="7" name="图片 6"/>
+          <p:cNvPicPr>
+            <a:picLocks noChangeAspect="1"/>
+          </p:cNvPicPr>
+          <p:nvPr/>
+        </p:nvPicPr>
+        <p:blipFill>
+          <a:blip r:embed="rId4"/>
+          <a:stretch>
+            <a:fillRect/>
+          </a:stretch>
+        </p:blipFill>
+        <p:spPr>
+          <a:xfrm>
+            <a:off x="1029215" y="3087497"/>
+            <a:ext cx="5278054" cy="1045486"/>
+          </a:xfrm>
+          <a:prstGeom prst="rect">
+            <a:avLst/>
+          </a:prstGeom>
+        </p:spPr>
+      </p:pic>
+      <p:pic>
+        <p:nvPicPr>
+          <p:cNvPr id="8" name="图片 7"/>
+          <p:cNvPicPr>
+            <a:picLocks noChangeAspect="1"/>
+          </p:cNvPicPr>
+          <p:nvPr/>
+        </p:nvPicPr>
+        <p:blipFill>
+          <a:blip r:embed="rId5"/>
+          <a:stretch>
+            <a:fillRect/>
+          </a:stretch>
+        </p:blipFill>
+        <p:spPr>
+          <a:xfrm>
+            <a:off x="3250911" y="5035465"/>
+            <a:ext cx="5278054" cy="1608220"/>
+          </a:xfrm>
+          <a:prstGeom prst="rect">
+            <a:avLst/>
+          </a:prstGeom>
+        </p:spPr>
+      </p:pic>
+      <p:pic>
+        <p:nvPicPr>
+          <p:cNvPr id="10" name="图片 9"/>
+          <p:cNvPicPr>
+            <a:picLocks noChangeAspect="1"/>
+          </p:cNvPicPr>
+          <p:nvPr/>
+        </p:nvPicPr>
+        <p:blipFill>
+          <a:blip r:embed="rId6"/>
+          <a:stretch>
+            <a:fillRect/>
+          </a:stretch>
+        </p:blipFill>
+        <p:spPr>
+          <a:xfrm>
+            <a:off x="6308364" y="1704797"/>
+            <a:ext cx="4693848" cy="367117"/>
+          </a:xfrm>
+          <a:prstGeom prst="rect">
+            <a:avLst/>
+          </a:prstGeom>
+        </p:spPr>
+      </p:pic>
+      <p:pic>
+        <p:nvPicPr>
+          <p:cNvPr id="11" name="图片 10"/>
+          <p:cNvPicPr>
+            <a:picLocks noChangeAspect="1"/>
+          </p:cNvPicPr>
+          <p:nvPr/>
+        </p:nvPicPr>
+        <p:blipFill>
+          <a:blip r:embed="rId7"/>
+          <a:stretch>
+            <a:fillRect/>
+          </a:stretch>
+        </p:blipFill>
+        <p:spPr>
+          <a:xfrm>
+            <a:off x="6307269" y="3411505"/>
+            <a:ext cx="2271250" cy="397469"/>
+          </a:xfrm>
+          <a:prstGeom prst="rect">
+            <a:avLst/>
+          </a:prstGeom>
+        </p:spPr>
+      </p:pic>
+      <p:pic>
+        <p:nvPicPr>
+          <p:cNvPr id="12" name="图片 11"/>
+          <p:cNvPicPr>
+            <a:picLocks noChangeAspect="1"/>
+          </p:cNvPicPr>
+          <p:nvPr/>
+        </p:nvPicPr>
+        <p:blipFill>
+          <a:blip r:embed="rId8"/>
+          <a:stretch>
+            <a:fillRect/>
+          </a:stretch>
+        </p:blipFill>
+        <p:spPr>
+          <a:xfrm>
+            <a:off x="8655288" y="3411504"/>
+            <a:ext cx="1944025" cy="397469"/>
           </a:xfrm>
           <a:prstGeom prst="rect">
             <a:avLst/>
@@ -4711,7 +4720,7 @@
     </p:spTree>
     <p:extLst>
       <p:ext uri="{BB962C8B-B14F-4D97-AF65-F5344CB8AC3E}">
-        <p14:creationId xmlns:p14="http://schemas.microsoft.com/office/powerpoint/2010/main" val="3379876225"/>
+        <p14:creationId xmlns:p14="http://schemas.microsoft.com/office/powerpoint/2010/main" val="856968648"/>
       </p:ext>
     </p:extLst>
   </p:cSld>
@@ -4761,11 +4770,18 @@
           <a:lstStyle/>
           <a:p>
             <a:r>
+              <a:rPr lang="en-US" altLang="zh-CN" sz="4000" dirty="0" err="1" smtClean="0">
+                <a:latin typeface="Times New Roman" panose="02020603050405020304" pitchFamily="18" charset="0"/>
+                <a:cs typeface="Times New Roman" panose="02020603050405020304" pitchFamily="18" charset="0"/>
+              </a:rPr>
+              <a:t>CrossNet</a:t>
+            </a:r>
+            <a:r>
               <a:rPr lang="en-US" altLang="zh-CN" sz="4000" dirty="0" smtClean="0">
                 <a:latin typeface="Times New Roman" panose="02020603050405020304" pitchFamily="18" charset="0"/>
                 <a:cs typeface="Times New Roman" panose="02020603050405020304" pitchFamily="18" charset="0"/>
               </a:rPr>
-              <a:t>Related NMTF</a:t>
+              <a:t> Algorithm</a:t>
             </a:r>
             <a:endParaRPr lang="zh-CN" altLang="en-US" sz="4000" dirty="0">
               <a:latin typeface="Times New Roman" panose="02020603050405020304" pitchFamily="18" charset="0"/>
@@ -4774,130 +4790,15 @@
           </a:p>
         </p:txBody>
       </p:sp>
-      <p:sp>
-        <p:nvSpPr>
-          <p:cNvPr id="3" name="内容占位符 2"/>
-          <p:cNvSpPr>
-            <a:spLocks noGrp="1"/>
-          </p:cNvSpPr>
-          <p:nvPr>
-            <p:ph idx="1"/>
-          </p:nvPr>
-        </p:nvSpPr>
-        <p:spPr>
-          <a:xfrm>
-            <a:off x="632138" y="1124973"/>
-            <a:ext cx="10515600" cy="4351338"/>
-          </a:xfrm>
-        </p:spPr>
-        <p:txBody>
-          <a:bodyPr/>
-          <a:lstStyle/>
-          <a:p>
-            <a:pPr marL="0" indent="0">
-              <a:buNone/>
-            </a:pPr>
-            <a:r>
-              <a:rPr lang="en-US" altLang="zh-CN" sz="2400" i="1" dirty="0" smtClean="0">
-                <a:latin typeface="Times New Roman" panose="02020603050405020304" pitchFamily="18" charset="0"/>
-                <a:cs typeface="Times New Roman" panose="02020603050405020304" pitchFamily="18" charset="0"/>
-              </a:rPr>
-              <a:t>NMTF</a:t>
-            </a:r>
-          </a:p>
-          <a:p>
-            <a:endParaRPr lang="en-US" altLang="zh-CN" dirty="0">
-              <a:latin typeface="Times New Roman" panose="02020603050405020304" pitchFamily="18" charset="0"/>
-              <a:cs typeface="Times New Roman" panose="02020603050405020304" pitchFamily="18" charset="0"/>
-            </a:endParaRPr>
-          </a:p>
-          <a:p>
-            <a:pPr marL="0" indent="0">
-              <a:buNone/>
-            </a:pPr>
-            <a:endParaRPr lang="en-US" altLang="zh-CN" i="1" dirty="0" smtClean="0">
-              <a:latin typeface="Times New Roman" panose="02020603050405020304" pitchFamily="18" charset="0"/>
-              <a:cs typeface="Times New Roman" panose="02020603050405020304" pitchFamily="18" charset="0"/>
-            </a:endParaRPr>
-          </a:p>
-          <a:p>
-            <a:pPr marL="0" indent="0">
-              <a:buNone/>
-            </a:pPr>
-            <a:r>
-              <a:rPr lang="en-US" altLang="zh-CN" sz="2400" i="1" dirty="0" smtClean="0">
-                <a:latin typeface="Times New Roman" panose="02020603050405020304" pitchFamily="18" charset="0"/>
-                <a:cs typeface="Times New Roman" panose="02020603050405020304" pitchFamily="18" charset="0"/>
-              </a:rPr>
-              <a:t>Graph based NMF</a:t>
-            </a:r>
-          </a:p>
-          <a:p>
-            <a:pPr marL="0" indent="0">
-              <a:buNone/>
-            </a:pPr>
-            <a:endParaRPr lang="en-US" altLang="zh-CN" dirty="0">
-              <a:latin typeface="Times New Roman" panose="02020603050405020304" pitchFamily="18" charset="0"/>
-              <a:cs typeface="Times New Roman" panose="02020603050405020304" pitchFamily="18" charset="0"/>
-            </a:endParaRPr>
-          </a:p>
-          <a:p>
-            <a:pPr marL="0" indent="0">
-              <a:buNone/>
-            </a:pPr>
-            <a:endParaRPr lang="en-US" altLang="zh-CN" dirty="0" smtClean="0">
-              <a:latin typeface="Times New Roman" panose="02020603050405020304" pitchFamily="18" charset="0"/>
-              <a:cs typeface="Times New Roman" panose="02020603050405020304" pitchFamily="18" charset="0"/>
-            </a:endParaRPr>
-          </a:p>
-          <a:p>
-            <a:pPr marL="0" indent="0">
-              <a:buNone/>
-            </a:pPr>
-            <a:endParaRPr lang="en-US" altLang="zh-CN" sz="2400" i="1" dirty="0" smtClean="0">
-              <a:latin typeface="Times New Roman" panose="02020603050405020304" pitchFamily="18" charset="0"/>
-              <a:cs typeface="Times New Roman" panose="02020603050405020304" pitchFamily="18" charset="0"/>
-            </a:endParaRPr>
-          </a:p>
-          <a:p>
-            <a:pPr marL="0" indent="0">
-              <a:buNone/>
-            </a:pPr>
-            <a:r>
-              <a:rPr lang="en-US" altLang="zh-CN" sz="2400" i="1" dirty="0" smtClean="0">
-                <a:latin typeface="Times New Roman" panose="02020603050405020304" pitchFamily="18" charset="0"/>
-                <a:cs typeface="Times New Roman" panose="02020603050405020304" pitchFamily="18" charset="0"/>
-              </a:rPr>
-              <a:t>IGNMTF       </a:t>
-            </a:r>
-            <a:r>
-              <a:rPr lang="en-US" altLang="zh-CN" sz="2400" i="1" dirty="0" err="1" smtClean="0">
-                <a:latin typeface="Times New Roman" panose="02020603050405020304" pitchFamily="18" charset="0"/>
-                <a:cs typeface="Times New Roman" panose="02020603050405020304" pitchFamily="18" charset="0"/>
-              </a:rPr>
-              <a:t>Gu</a:t>
-            </a:r>
-            <a:r>
-              <a:rPr lang="en-US" altLang="zh-CN" sz="2400" i="1" dirty="0" smtClean="0">
-                <a:latin typeface="Times New Roman" panose="02020603050405020304" pitchFamily="18" charset="0"/>
-                <a:cs typeface="Times New Roman" panose="02020603050405020304" pitchFamily="18" charset="0"/>
-              </a:rPr>
-              <a:t>, Ding, Han(2011) + Huang et al.(2014)</a:t>
-            </a:r>
-            <a:endParaRPr lang="zh-CN" altLang="en-US" sz="2400" i="1" dirty="0">
-              <a:latin typeface="Times New Roman" panose="02020603050405020304" pitchFamily="18" charset="0"/>
-              <a:cs typeface="Times New Roman" panose="02020603050405020304" pitchFamily="18" charset="0"/>
-            </a:endParaRPr>
-          </a:p>
-        </p:txBody>
-      </p:sp>
       <p:pic>
         <p:nvPicPr>
-          <p:cNvPr id="6" name="图片 5"/>
+          <p:cNvPr id="4" name="内容占位符 3"/>
           <p:cNvPicPr>
-            <a:picLocks noChangeAspect="1"/>
+            <a:picLocks noGrp="1" noChangeAspect="1"/>
           </p:cNvPicPr>
-          <p:nvPr/>
+          <p:nvPr>
+            <p:ph idx="1"/>
+          </p:nvPr>
         </p:nvPicPr>
         <p:blipFill>
           <a:blip r:embed="rId3"/>
@@ -4907,8 +4808,8 @@
         </p:blipFill>
         <p:spPr>
           <a:xfrm>
-            <a:off x="1029215" y="1558357"/>
-            <a:ext cx="5279149" cy="659999"/>
+            <a:off x="516324" y="958275"/>
+            <a:ext cx="5789867" cy="1720531"/>
           </a:xfrm>
           <a:prstGeom prst="rect">
             <a:avLst/>
@@ -4917,7 +4818,7 @@
       </p:pic>
       <p:pic>
         <p:nvPicPr>
-          <p:cNvPr id="7" name="图片 6"/>
+          <p:cNvPr id="3" name="图片 2"/>
           <p:cNvPicPr>
             <a:picLocks noChangeAspect="1"/>
           </p:cNvPicPr>
@@ -4931,8 +4832,8 @@
         </p:blipFill>
         <p:spPr>
           <a:xfrm>
-            <a:off x="1029215" y="3087497"/>
-            <a:ext cx="5278054" cy="1045486"/>
+            <a:off x="987216" y="2984624"/>
+            <a:ext cx="4435205" cy="3770345"/>
           </a:xfrm>
           <a:prstGeom prst="rect">
             <a:avLst/>
@@ -4941,7 +4842,7 @@
       </p:pic>
       <p:pic>
         <p:nvPicPr>
-          <p:cNvPr id="8" name="图片 7"/>
+          <p:cNvPr id="6" name="图片 5"/>
           <p:cNvPicPr>
             <a:picLocks noChangeAspect="1"/>
           </p:cNvPicPr>
@@ -4955,8 +4856,8 @@
         </p:blipFill>
         <p:spPr>
           <a:xfrm>
-            <a:off x="3250911" y="5035465"/>
-            <a:ext cx="5278054" cy="1608220"/>
+            <a:off x="6677406" y="1250967"/>
+            <a:ext cx="5019048" cy="1285714"/>
           </a:xfrm>
           <a:prstGeom prst="rect">
             <a:avLst/>
@@ -4965,7 +4866,7 @@
       </p:pic>
       <p:pic>
         <p:nvPicPr>
-          <p:cNvPr id="10" name="图片 9"/>
+          <p:cNvPr id="7" name="图片 6"/>
           <p:cNvPicPr>
             <a:picLocks noChangeAspect="1"/>
           </p:cNvPicPr>
@@ -4979,8 +4880,8 @@
         </p:blipFill>
         <p:spPr>
           <a:xfrm>
-            <a:off x="6308364" y="1704797"/>
-            <a:ext cx="4693848" cy="367117"/>
+            <a:off x="6833452" y="3206695"/>
+            <a:ext cx="4314286" cy="1161905"/>
           </a:xfrm>
           <a:prstGeom prst="rect">
             <a:avLst/>
@@ -4989,7 +4890,7 @@
       </p:pic>
       <p:pic>
         <p:nvPicPr>
-          <p:cNvPr id="11" name="图片 10"/>
+          <p:cNvPr id="8" name="图片 7"/>
           <p:cNvPicPr>
             <a:picLocks noChangeAspect="1"/>
           </p:cNvPicPr>
@@ -5003,8 +4904,8 @@
         </p:blipFill>
         <p:spPr>
           <a:xfrm>
-            <a:off x="6307269" y="3411505"/>
-            <a:ext cx="2271250" cy="397469"/>
+            <a:off x="6947738" y="4767616"/>
+            <a:ext cx="4085714" cy="1190476"/>
           </a:xfrm>
           <a:prstGeom prst="rect">
             <a:avLst/>
@@ -5013,7 +4914,7 @@
       </p:pic>
       <p:pic>
         <p:nvPicPr>
-          <p:cNvPr id="12" name="图片 11"/>
+          <p:cNvPr id="9" name="图片 8"/>
           <p:cNvPicPr>
             <a:picLocks noChangeAspect="1"/>
           </p:cNvPicPr>
@@ -5027,8 +4928,8 @@
         </p:blipFill>
         <p:spPr>
           <a:xfrm>
-            <a:off x="8655288" y="3411504"/>
-            <a:ext cx="1944025" cy="397469"/>
+            <a:off x="1343818" y="2489385"/>
+            <a:ext cx="2816058" cy="378841"/>
           </a:xfrm>
           <a:prstGeom prst="rect">
             <a:avLst/>
@@ -5038,7 +4939,7 @@
     </p:spTree>
     <p:extLst>
       <p:ext uri="{BB962C8B-B14F-4D97-AF65-F5344CB8AC3E}">
-        <p14:creationId xmlns:p14="http://schemas.microsoft.com/office/powerpoint/2010/main" val="856968648"/>
+        <p14:creationId xmlns:p14="http://schemas.microsoft.com/office/powerpoint/2010/main" val="3655171728"/>
       </p:ext>
     </p:extLst>
   </p:cSld>
@@ -5099,7 +5000,7 @@
                 <a:latin typeface="Times New Roman" panose="02020603050405020304" pitchFamily="18" charset="0"/>
                 <a:cs typeface="Times New Roman" panose="02020603050405020304" pitchFamily="18" charset="0"/>
               </a:rPr>
-              <a:t> Algorithm</a:t>
+              <a:t> Algorithm &amp; Datasets</a:t>
             </a:r>
             <a:endParaRPr lang="zh-CN" altLang="en-US" sz="4000" dirty="0">
               <a:latin typeface="Times New Roman" panose="02020603050405020304" pitchFamily="18" charset="0"/>
@@ -5110,13 +5011,11 @@
       </p:sp>
       <p:pic>
         <p:nvPicPr>
-          <p:cNvPr id="4" name="内容占位符 3"/>
+          <p:cNvPr id="5" name="图片 4"/>
           <p:cNvPicPr>
-            <a:picLocks noGrp="1" noChangeAspect="1"/>
+            <a:picLocks noChangeAspect="1"/>
           </p:cNvPicPr>
-          <p:nvPr>
-            <p:ph idx="1"/>
-          </p:nvPr>
+          <p:nvPr/>
         </p:nvPicPr>
         <p:blipFill>
           <a:blip r:embed="rId3"/>
@@ -5126,8 +5025,8 @@
         </p:blipFill>
         <p:spPr>
           <a:xfrm>
-            <a:off x="516324" y="958275"/>
-            <a:ext cx="5789867" cy="1720531"/>
+            <a:off x="531785" y="1093743"/>
+            <a:ext cx="5323809" cy="4885714"/>
           </a:xfrm>
           <a:prstGeom prst="rect">
             <a:avLst/>
@@ -5136,7 +5035,7 @@
       </p:pic>
       <p:pic>
         <p:nvPicPr>
-          <p:cNvPr id="3" name="图片 2"/>
+          <p:cNvPr id="7" name="图片 6"/>
           <p:cNvPicPr>
             <a:picLocks noChangeAspect="1"/>
           </p:cNvPicPr>
@@ -5150,114 +5049,54 @@
         </p:blipFill>
         <p:spPr>
           <a:xfrm>
-            <a:off x="987216" y="2984624"/>
-            <a:ext cx="4435205" cy="3770345"/>
+            <a:off x="6554813" y="1634655"/>
+            <a:ext cx="5404180" cy="3568409"/>
           </a:xfrm>
           <a:prstGeom prst="rect">
             <a:avLst/>
           </a:prstGeom>
         </p:spPr>
       </p:pic>
-      <p:pic>
-        <p:nvPicPr>
-          <p:cNvPr id="6" name="图片 5"/>
-          <p:cNvPicPr>
-            <a:picLocks noChangeAspect="1"/>
-          </p:cNvPicPr>
+      <p:sp>
+        <p:nvSpPr>
+          <p:cNvPr id="8" name="文本框 7"/>
+          <p:cNvSpPr txBox="1"/>
           <p:nvPr/>
-        </p:nvPicPr>
-        <p:blipFill>
-          <a:blip r:embed="rId5"/>
-          <a:stretch>
-            <a:fillRect/>
-          </a:stretch>
-        </p:blipFill>
-        <p:spPr>
-          <a:xfrm>
-            <a:off x="6677406" y="1250967"/>
-            <a:ext cx="5019048" cy="1285714"/>
+        </p:nvSpPr>
+        <p:spPr>
+          <a:xfrm>
+            <a:off x="759854" y="6057716"/>
+            <a:ext cx="9105363" cy="461665"/>
           </a:xfrm>
           <a:prstGeom prst="rect">
             <a:avLst/>
           </a:prstGeom>
-        </p:spPr>
-      </p:pic>
-      <p:pic>
-        <p:nvPicPr>
-          <p:cNvPr id="7" name="图片 6"/>
-          <p:cNvPicPr>
-            <a:picLocks noChangeAspect="1"/>
-          </p:cNvPicPr>
-          <p:nvPr/>
-        </p:nvPicPr>
-        <p:blipFill>
-          <a:blip r:embed="rId6"/>
-          <a:stretch>
-            <a:fillRect/>
-          </a:stretch>
-        </p:blipFill>
-        <p:spPr>
-          <a:xfrm>
-            <a:off x="6833452" y="3206695"/>
-            <a:ext cx="4314286" cy="1161905"/>
-          </a:xfrm>
-          <a:prstGeom prst="rect">
-            <a:avLst/>
-          </a:prstGeom>
-        </p:spPr>
-      </p:pic>
-      <p:pic>
-        <p:nvPicPr>
-          <p:cNvPr id="8" name="图片 7"/>
-          <p:cNvPicPr>
-            <a:picLocks noChangeAspect="1"/>
-          </p:cNvPicPr>
-          <p:nvPr/>
-        </p:nvPicPr>
-        <p:blipFill>
-          <a:blip r:embed="rId7"/>
-          <a:stretch>
-            <a:fillRect/>
-          </a:stretch>
-        </p:blipFill>
-        <p:spPr>
-          <a:xfrm>
-            <a:off x="6947738" y="4767616"/>
-            <a:ext cx="4085714" cy="1190476"/>
-          </a:xfrm>
-          <a:prstGeom prst="rect">
-            <a:avLst/>
-          </a:prstGeom>
-        </p:spPr>
-      </p:pic>
-      <p:pic>
-        <p:nvPicPr>
-          <p:cNvPr id="9" name="图片 8"/>
-          <p:cNvPicPr>
-            <a:picLocks noChangeAspect="1"/>
-          </p:cNvPicPr>
-          <p:nvPr/>
-        </p:nvPicPr>
-        <p:blipFill>
-          <a:blip r:embed="rId8"/>
-          <a:stretch>
-            <a:fillRect/>
-          </a:stretch>
-        </p:blipFill>
-        <p:spPr>
-          <a:xfrm>
-            <a:off x="1343818" y="2489385"/>
-            <a:ext cx="2816058" cy="378841"/>
-          </a:xfrm>
-          <a:prstGeom prst="rect">
-            <a:avLst/>
-          </a:prstGeom>
-        </p:spPr>
-      </p:pic>
+          <a:noFill/>
+        </p:spPr>
+        <p:txBody>
+          <a:bodyPr wrap="square" rtlCol="0">
+            <a:spAutoFit/>
+          </a:bodyPr>
+          <a:lstStyle/>
+          <a:p>
+            <a:r>
+              <a:rPr lang="en-US" altLang="zh-CN" sz="2400" b="1" dirty="0" smtClean="0">
+                <a:latin typeface="Times New Roman" panose="02020603050405020304" pitchFamily="18" charset="0"/>
+                <a:cs typeface="Times New Roman" panose="02020603050405020304" pitchFamily="18" charset="0"/>
+              </a:rPr>
+              <a:t>Link Recommendation -&gt; Random Walk with Restart</a:t>
+            </a:r>
+            <a:endParaRPr lang="zh-CN" altLang="en-US" sz="2400" b="1" dirty="0">
+              <a:latin typeface="Times New Roman" panose="02020603050405020304" pitchFamily="18" charset="0"/>
+              <a:cs typeface="Times New Roman" panose="02020603050405020304" pitchFamily="18" charset="0"/>
+            </a:endParaRPr>
+          </a:p>
+        </p:txBody>
+      </p:sp>
     </p:spTree>
     <p:extLst>
       <p:ext uri="{BB962C8B-B14F-4D97-AF65-F5344CB8AC3E}">
-        <p14:creationId xmlns:p14="http://schemas.microsoft.com/office/powerpoint/2010/main" val="3655171728"/>
+        <p14:creationId xmlns:p14="http://schemas.microsoft.com/office/powerpoint/2010/main" val="972582146"/>
       </p:ext>
     </p:extLst>
   </p:cSld>
@@ -5307,18 +5146,11 @@
           <a:lstStyle/>
           <a:p>
             <a:r>
-              <a:rPr lang="en-US" altLang="zh-CN" sz="4000" dirty="0" err="1" smtClean="0">
-                <a:latin typeface="Times New Roman" panose="02020603050405020304" pitchFamily="18" charset="0"/>
-                <a:cs typeface="Times New Roman" panose="02020603050405020304" pitchFamily="18" charset="0"/>
-              </a:rPr>
-              <a:t>CrossNet</a:t>
-            </a:r>
-            <a:r>
               <a:rPr lang="en-US" altLang="zh-CN" sz="4000" dirty="0" smtClean="0">
                 <a:latin typeface="Times New Roman" panose="02020603050405020304" pitchFamily="18" charset="0"/>
                 <a:cs typeface="Times New Roman" panose="02020603050405020304" pitchFamily="18" charset="0"/>
               </a:rPr>
-              <a:t> Algorithm &amp; Datasets</a:t>
+              <a:t>Performance</a:t>
             </a:r>
             <a:endParaRPr lang="zh-CN" altLang="en-US" sz="4000" dirty="0">
               <a:latin typeface="Times New Roman" panose="02020603050405020304" pitchFamily="18" charset="0"/>
@@ -5329,7 +5161,7 @@
       </p:sp>
       <p:pic>
         <p:nvPicPr>
-          <p:cNvPr id="5" name="图片 4"/>
+          <p:cNvPr id="3" name="图片 2"/>
           <p:cNvPicPr>
             <a:picLocks noChangeAspect="1"/>
           </p:cNvPicPr>
@@ -5343,8 +5175,8 @@
         </p:blipFill>
         <p:spPr>
           <a:xfrm>
-            <a:off x="531785" y="1093743"/>
-            <a:ext cx="5323809" cy="4885714"/>
+            <a:off x="1664615" y="1011786"/>
+            <a:ext cx="8914286" cy="2890513"/>
           </a:xfrm>
           <a:prstGeom prst="rect">
             <a:avLst/>
@@ -5353,7 +5185,7 @@
       </p:pic>
       <p:pic>
         <p:nvPicPr>
-          <p:cNvPr id="7" name="图片 6"/>
+          <p:cNvPr id="4" name="图片 3"/>
           <p:cNvPicPr>
             <a:picLocks noChangeAspect="1"/>
           </p:cNvPicPr>
@@ -5367,54 +5199,18 @@
         </p:blipFill>
         <p:spPr>
           <a:xfrm>
-            <a:off x="6554813" y="1634655"/>
-            <a:ext cx="5404180" cy="3568409"/>
+            <a:off x="1272949" y="3902299"/>
+            <a:ext cx="9980952" cy="2771429"/>
           </a:xfrm>
           <a:prstGeom prst="rect">
             <a:avLst/>
           </a:prstGeom>
         </p:spPr>
       </p:pic>
-      <p:sp>
-        <p:nvSpPr>
-          <p:cNvPr id="8" name="文本框 7"/>
-          <p:cNvSpPr txBox="1"/>
-          <p:nvPr/>
-        </p:nvSpPr>
-        <p:spPr>
-          <a:xfrm>
-            <a:off x="759854" y="6057716"/>
-            <a:ext cx="9105363" cy="461665"/>
-          </a:xfrm>
-          <a:prstGeom prst="rect">
-            <a:avLst/>
-          </a:prstGeom>
-          <a:noFill/>
-        </p:spPr>
-        <p:txBody>
-          <a:bodyPr wrap="square" rtlCol="0">
-            <a:spAutoFit/>
-          </a:bodyPr>
-          <a:lstStyle/>
-          <a:p>
-            <a:r>
-              <a:rPr lang="en-US" altLang="zh-CN" sz="2400" b="1" dirty="0" smtClean="0">
-                <a:latin typeface="Times New Roman" panose="02020603050405020304" pitchFamily="18" charset="0"/>
-                <a:cs typeface="Times New Roman" panose="02020603050405020304" pitchFamily="18" charset="0"/>
-              </a:rPr>
-              <a:t>Link Recommendation -&gt; Random Walk with Restart</a:t>
-            </a:r>
-            <a:endParaRPr lang="zh-CN" altLang="en-US" sz="2400" b="1" dirty="0">
-              <a:latin typeface="Times New Roman" panose="02020603050405020304" pitchFamily="18" charset="0"/>
-              <a:cs typeface="Times New Roman" panose="02020603050405020304" pitchFamily="18" charset="0"/>
-            </a:endParaRPr>
-          </a:p>
-        </p:txBody>
-      </p:sp>
     </p:spTree>
     <p:extLst>
       <p:ext uri="{BB962C8B-B14F-4D97-AF65-F5344CB8AC3E}">
-        <p14:creationId xmlns:p14="http://schemas.microsoft.com/office/powerpoint/2010/main" val="972582146"/>
+        <p14:creationId xmlns:p14="http://schemas.microsoft.com/office/powerpoint/2010/main" val="1525522434"/>
       </p:ext>
     </p:extLst>
   </p:cSld>
@@ -5451,12 +5247,7 @@
             <p:ph type="title"/>
           </p:nvPr>
         </p:nvSpPr>
-        <p:spPr>
-          <a:xfrm>
-            <a:off x="632138" y="0"/>
-            <a:ext cx="10515600" cy="1325563"/>
-          </a:xfrm>
-        </p:spPr>
+        <p:spPr/>
         <p:txBody>
           <a:bodyPr>
             <a:normAutofit/>
@@ -5468,7 +5259,7 @@
                 <a:latin typeface="Times New Roman" panose="02020603050405020304" pitchFamily="18" charset="0"/>
                 <a:cs typeface="Times New Roman" panose="02020603050405020304" pitchFamily="18" charset="0"/>
               </a:rPr>
-              <a:t>Performance</a:t>
+              <a:t>Conclusion</a:t>
             </a:r>
             <a:endParaRPr lang="zh-CN" altLang="en-US" sz="4000" dirty="0">
               <a:latin typeface="Times New Roman" panose="02020603050405020304" pitchFamily="18" charset="0"/>
@@ -5477,58 +5268,68 @@
           </a:p>
         </p:txBody>
       </p:sp>
-      <p:pic>
-        <p:nvPicPr>
-          <p:cNvPr id="3" name="图片 2"/>
-          <p:cNvPicPr>
-            <a:picLocks noChangeAspect="1"/>
-          </p:cNvPicPr>
-          <p:nvPr/>
-        </p:nvPicPr>
-        <p:blipFill>
-          <a:blip r:embed="rId3"/>
-          <a:stretch>
-            <a:fillRect/>
-          </a:stretch>
-        </p:blipFill>
-        <p:spPr>
-          <a:xfrm>
-            <a:off x="1664615" y="1011786"/>
-            <a:ext cx="8914286" cy="2890513"/>
-          </a:xfrm>
-          <a:prstGeom prst="rect">
-            <a:avLst/>
-          </a:prstGeom>
-        </p:spPr>
-      </p:pic>
-      <p:pic>
-        <p:nvPicPr>
-          <p:cNvPr id="4" name="图片 3"/>
-          <p:cNvPicPr>
-            <a:picLocks noChangeAspect="1"/>
-          </p:cNvPicPr>
-          <p:nvPr/>
-        </p:nvPicPr>
-        <p:blipFill>
-          <a:blip r:embed="rId4"/>
-          <a:stretch>
-            <a:fillRect/>
-          </a:stretch>
-        </p:blipFill>
-        <p:spPr>
-          <a:xfrm>
-            <a:off x="1272949" y="3902299"/>
-            <a:ext cx="9980952" cy="2771429"/>
-          </a:xfrm>
-          <a:prstGeom prst="rect">
-            <a:avLst/>
-          </a:prstGeom>
-        </p:spPr>
-      </p:pic>
+      <p:sp>
+        <p:nvSpPr>
+          <p:cNvPr id="3" name="内容占位符 2"/>
+          <p:cNvSpPr>
+            <a:spLocks noGrp="1"/>
+          </p:cNvSpPr>
+          <p:nvPr>
+            <p:ph idx="1"/>
+          </p:nvPr>
+        </p:nvSpPr>
+        <p:spPr/>
+        <p:txBody>
+          <a:bodyPr/>
+          <a:lstStyle/>
+          <a:p>
+            <a:r>
+              <a:rPr lang="en-US" altLang="zh-CN" sz="3200" dirty="0" smtClean="0">
+                <a:latin typeface="Times New Roman" panose="02020603050405020304" pitchFamily="18" charset="0"/>
+                <a:cs typeface="Times New Roman" panose="02020603050405020304" pitchFamily="18" charset="0"/>
+              </a:rPr>
+              <a:t>NMTF</a:t>
+            </a:r>
+          </a:p>
+          <a:p>
+            <a:endParaRPr lang="en-US" altLang="zh-CN" sz="3200" dirty="0">
+              <a:latin typeface="Times New Roman" panose="02020603050405020304" pitchFamily="18" charset="0"/>
+              <a:cs typeface="Times New Roman" panose="02020603050405020304" pitchFamily="18" charset="0"/>
+            </a:endParaRPr>
+          </a:p>
+          <a:p>
+            <a:r>
+              <a:rPr lang="en-US" altLang="zh-CN" sz="3200" dirty="0" smtClean="0">
+                <a:latin typeface="Times New Roman" panose="02020603050405020304" pitchFamily="18" charset="0"/>
+                <a:cs typeface="Times New Roman" panose="02020603050405020304" pitchFamily="18" charset="0"/>
+              </a:rPr>
+              <a:t>Symmetric Normalized Laplacian</a:t>
+            </a:r>
+          </a:p>
+          <a:p>
+            <a:endParaRPr lang="en-US" altLang="zh-CN" sz="3200" dirty="0">
+              <a:latin typeface="Times New Roman" panose="02020603050405020304" pitchFamily="18" charset="0"/>
+              <a:cs typeface="Times New Roman" panose="02020603050405020304" pitchFamily="18" charset="0"/>
+            </a:endParaRPr>
+          </a:p>
+          <a:p>
+            <a:r>
+              <a:rPr lang="en-US" altLang="zh-CN" sz="3200" dirty="0" smtClean="0">
+                <a:latin typeface="Times New Roman" panose="02020603050405020304" pitchFamily="18" charset="0"/>
+                <a:cs typeface="Times New Roman" panose="02020603050405020304" pitchFamily="18" charset="0"/>
+              </a:rPr>
+              <a:t>Orthogonal Constraints</a:t>
+            </a:r>
+          </a:p>
+          <a:p>
+            <a:endParaRPr lang="zh-CN" altLang="en-US" dirty="0"/>
+          </a:p>
+        </p:txBody>
+      </p:sp>
     </p:spTree>
     <p:extLst>
       <p:ext uri="{BB962C8B-B14F-4D97-AF65-F5344CB8AC3E}">
-        <p14:creationId xmlns:p14="http://schemas.microsoft.com/office/powerpoint/2010/main" val="1525522434"/>
+        <p14:creationId xmlns:p14="http://schemas.microsoft.com/office/powerpoint/2010/main" val="1786191513"/>
       </p:ext>
     </p:extLst>
   </p:cSld>
@@ -5557,103 +5358,66 @@
       </p:grpSpPr>
       <p:sp>
         <p:nvSpPr>
-          <p:cNvPr id="2" name="标题 1"/>
-          <p:cNvSpPr>
-            <a:spLocks noGrp="1"/>
-          </p:cNvSpPr>
-          <p:nvPr>
-            <p:ph type="title"/>
-          </p:nvPr>
-        </p:nvSpPr>
-        <p:spPr/>
-        <p:txBody>
-          <a:bodyPr>
-            <a:normAutofit/>
+          <p:cNvPr id="9" name="TextBox 8"/>
+          <p:cNvSpPr txBox="1"/>
+          <p:nvPr/>
+        </p:nvSpPr>
+        <p:spPr>
+          <a:xfrm>
+            <a:off x="3754335" y="2690336"/>
+            <a:ext cx="4683333" cy="1200329"/>
+          </a:xfrm>
+          <a:prstGeom prst="rect">
+            <a:avLst/>
+          </a:prstGeom>
+          <a:noFill/>
+        </p:spPr>
+        <p:txBody>
+          <a:bodyPr wrap="none" rtlCol="0">
+            <a:spAutoFit/>
           </a:bodyPr>
           <a:lstStyle/>
           <a:p>
-            <a:r>
-              <a:rPr lang="en-US" altLang="zh-CN" sz="4000" dirty="0" smtClean="0">
-                <a:latin typeface="Times New Roman" panose="02020603050405020304" pitchFamily="18" charset="0"/>
-                <a:cs typeface="Times New Roman" panose="02020603050405020304" pitchFamily="18" charset="0"/>
+            <a:pPr algn="ctr"/>
+            <a:r>
+              <a:rPr lang="en-US" sz="7200" smtClean="0">
+                <a:solidFill>
+                  <a:schemeClr val="tx1">
+                    <a:lumMod val="75000"/>
+                    <a:lumOff val="25000"/>
+                  </a:schemeClr>
+                </a:solidFill>
+                <a:latin typeface="GeosansLight" panose="02000603020000020003" pitchFamily="2" charset="0"/>
               </a:rPr>
-              <a:t>Conclusion</a:t>
-            </a:r>
-            <a:endParaRPr lang="zh-CN" altLang="en-US" sz="4000" dirty="0">
-              <a:latin typeface="Times New Roman" panose="02020603050405020304" pitchFamily="18" charset="0"/>
-              <a:cs typeface="Times New Roman" panose="02020603050405020304" pitchFamily="18" charset="0"/>
+              <a:t>THANK YOU</a:t>
+            </a:r>
+            <a:endParaRPr lang="en-US" sz="7200">
+              <a:solidFill>
+                <a:schemeClr val="tx1">
+                  <a:lumMod val="75000"/>
+                  <a:lumOff val="25000"/>
+                </a:schemeClr>
+              </a:solidFill>
+              <a:latin typeface="GeosansLight" panose="02000603020000020003" pitchFamily="2" charset="0"/>
             </a:endParaRPr>
           </a:p>
         </p:txBody>
       </p:sp>
-      <p:sp>
-        <p:nvSpPr>
-          <p:cNvPr id="3" name="内容占位符 2"/>
-          <p:cNvSpPr>
-            <a:spLocks noGrp="1"/>
-          </p:cNvSpPr>
-          <p:nvPr>
-            <p:ph idx="1"/>
-          </p:nvPr>
-        </p:nvSpPr>
-        <p:spPr/>
-        <p:txBody>
-          <a:bodyPr/>
-          <a:lstStyle/>
-          <a:p>
-            <a:r>
-              <a:rPr lang="en-US" altLang="zh-CN" sz="3200" dirty="0" smtClean="0">
-                <a:latin typeface="Times New Roman" panose="02020603050405020304" pitchFamily="18" charset="0"/>
-                <a:cs typeface="Times New Roman" panose="02020603050405020304" pitchFamily="18" charset="0"/>
-              </a:rPr>
-              <a:t>NMTF</a:t>
-            </a:r>
-          </a:p>
-          <a:p>
-            <a:endParaRPr lang="en-US" altLang="zh-CN" sz="3200" dirty="0">
-              <a:latin typeface="Times New Roman" panose="02020603050405020304" pitchFamily="18" charset="0"/>
-              <a:cs typeface="Times New Roman" panose="02020603050405020304" pitchFamily="18" charset="0"/>
-            </a:endParaRPr>
-          </a:p>
-          <a:p>
-            <a:r>
-              <a:rPr lang="en-US" altLang="zh-CN" sz="3200" dirty="0" smtClean="0">
-                <a:latin typeface="Times New Roman" panose="02020603050405020304" pitchFamily="18" charset="0"/>
-                <a:cs typeface="Times New Roman" panose="02020603050405020304" pitchFamily="18" charset="0"/>
-              </a:rPr>
-              <a:t>Symmetric Normalized Laplacian</a:t>
-            </a:r>
-          </a:p>
-          <a:p>
-            <a:endParaRPr lang="en-US" altLang="zh-CN" sz="3200" dirty="0">
-              <a:latin typeface="Times New Roman" panose="02020603050405020304" pitchFamily="18" charset="0"/>
-              <a:cs typeface="Times New Roman" panose="02020603050405020304" pitchFamily="18" charset="0"/>
-            </a:endParaRPr>
-          </a:p>
-          <a:p>
-            <a:r>
-              <a:rPr lang="en-US" altLang="zh-CN" sz="3200" dirty="0" smtClean="0">
-                <a:latin typeface="Times New Roman" panose="02020603050405020304" pitchFamily="18" charset="0"/>
-                <a:cs typeface="Times New Roman" panose="02020603050405020304" pitchFamily="18" charset="0"/>
-              </a:rPr>
-              <a:t>Orthogonal Constraints</a:t>
-            </a:r>
-          </a:p>
-          <a:p>
-            <a:endParaRPr lang="zh-CN" altLang="en-US" dirty="0"/>
-          </a:p>
-        </p:txBody>
-      </p:sp>
     </p:spTree>
-    <p:extLst>
-      <p:ext uri="{BB962C8B-B14F-4D97-AF65-F5344CB8AC3E}">
-        <p14:creationId xmlns:p14="http://schemas.microsoft.com/office/powerpoint/2010/main" val="1786191513"/>
-      </p:ext>
-    </p:extLst>
   </p:cSld>
   <p:clrMapOvr>
     <a:masterClrMapping/>
   </p:clrMapOvr>
+  <p:transition spd="slow">
+    <p:push dir="u"/>
+  </p:transition>
+  <p:timing>
+    <p:tnLst>
+      <p:par>
+        <p:cTn id="1" dur="indefinite" restart="never" nodeType="tmRoot"/>
+      </p:par>
+    </p:tnLst>
+  </p:timing>
 </p:sld>
 </file>
 

</xml_diff>